<commit_message>
Add Original Color option for pptx
</commit_message>
<xml_diff>
--- a/pptx/Micro-Economics.pptx
+++ b/pptx/Micro-Economics.pptx
@@ -14,6 +14,8 @@
     <p:sldId id="262" r:id="rId12"/>
     <p:sldId id="263" r:id="rId13"/>
     <p:sldId id="264" r:id="rId14"/>
+    <p:sldId id="265" r:id="rId15"/>
+    <p:sldId id="266" r:id="rId16"/>
   </p:sldIdLst>
   <p:sldSz cx="9144000" cy="6858000" type="screen4x3"/>
   <p:notesSz cx="6858000" cy="9144000"/>
@@ -2547,9 +2549,11 @@
 <p:sldMaster xmlns:a="http://schemas.openxmlformats.org/drawingml/2006/main" xmlns:r="http://schemas.openxmlformats.org/officeDocument/2006/relationships" xmlns:p="http://schemas.openxmlformats.org/presentationml/2006/main">
   <p:cSld>
     <p:bg>
-      <p:bgRef idx="1001">
-        <a:schemeClr val="bg1"/>
-      </p:bgRef>
+      <p:bgPr>
+        <a:solidFill>
+          <a:srgbClr val="0000FF"/>
+        </a:solidFill>
+      </p:bgPr>
     </p:bg>
     <p:spTree>
       <p:nvGrpSpPr>
@@ -3090,10 +3094,164 @@
             <a:r>
               <a:rPr lang="en-US" sz="6000">
                 <a:solidFill>
-                  <a:srgbClr val="000000"/>
+                  <a:srgbClr val="FFFFFF"/>
                 </a:solidFill>
               </a:rPr>
               <a:t>Micro-Economics</a:t>
+            </a:r>
+          </a:p>
+        </p:txBody>
+      </p:sp>
+    </p:spTree>
+  </p:cSld>
+  <p:clrMapOvr>
+    <a:masterClrMapping/>
+  </p:clrMapOvr>
+</p:sld>
+</file>
+
+<file path=ppt/slides/slide10.xml><?xml version="1.0" encoding="utf-8"?>
+<p:sld xmlns:p="http://schemas.openxmlformats.org/presentationml/2006/main" xmlns:a="http://schemas.openxmlformats.org/drawingml/2006/main">
+  <p:cSld>
+    <p:spTree>
+      <p:nvGrpSpPr>
+        <p:cNvPr id="1" name=""/>
+        <p:cNvGrpSpPr/>
+        <p:nvPr/>
+      </p:nvGrpSpPr>
+      <p:grpSpPr>
+        <a:xfrm>
+          <a:off x="0" y="0"/>
+          <a:ext cx="0" cy="0"/>
+          <a:chOff x="0" y="0"/>
+          <a:chExt cx="0" cy="0"/>
+        </a:xfrm>
+      </p:grpSpPr>
+      <p:sp xmlns:r="http://schemas.openxmlformats.org/officeDocument/2006/relationships">
+        <p:nvSpPr>
+          <p:cNvPr id="2" name="Title 1"/>
+          <p:cNvSpPr>
+            <a:spLocks noGrp="1"/>
+          </p:cNvSpPr>
+          <p:nvPr>
+            <p:ph type="title"/>
+          </p:nvPr>
+        </p:nvSpPr>
+        <p:spPr/>
+        <p:txBody>
+          <a:bodyPr/>
+          <a:lstStyle/>
+          <a:p>
+            <a:r>
+              <a:rPr lang="en-US" sz="5000">
+                <a:solidFill>
+                  <a:srgbClr val="FFFFFF"/>
+                </a:solidFill>
+              </a:rPr>
+              <a:t>Question 5</a:t>
+            </a:r>
+          </a:p>
+        </p:txBody>
+      </p:sp>
+      <p:sp xmlns:r="http://schemas.openxmlformats.org/officeDocument/2006/relationships">
+        <p:nvSpPr>
+          <p:cNvPr id="3" name="Content Placeholder 2"/>
+          <p:cNvSpPr>
+            <a:spLocks noGrp="1"/>
+          </p:cNvSpPr>
+          <p:nvPr>
+            <p:ph idx="1"/>
+          </p:nvPr>
+        </p:nvSpPr>
+        <p:spPr/>
+        <p:txBody>
+          <a:bodyPr/>
+          <a:lstStyle/>
+          <a:p>
+            <a:r>
+              <a:rPr lang="en-US" sz="4000">
+                <a:solidFill>
+                  <a:srgbClr val="FFFFFF"/>
+                </a:solidFill>
+              </a:rPr>
+              <a:t>What is Market Failure?</a:t>
+            </a:r>
+          </a:p>
+        </p:txBody>
+      </p:sp>
+    </p:spTree>
+  </p:cSld>
+  <p:clrMapOvr>
+    <a:masterClrMapping/>
+  </p:clrMapOvr>
+</p:sld>
+</file>
+
+<file path=ppt/slides/slide11.xml><?xml version="1.0" encoding="utf-8"?>
+<p:sld xmlns:p="http://schemas.openxmlformats.org/presentationml/2006/main" xmlns:a="http://schemas.openxmlformats.org/drawingml/2006/main">
+  <p:cSld>
+    <p:spTree>
+      <p:nvGrpSpPr>
+        <p:cNvPr id="1" name=""/>
+        <p:cNvGrpSpPr/>
+        <p:nvPr/>
+      </p:nvGrpSpPr>
+      <p:grpSpPr>
+        <a:xfrm>
+          <a:off x="0" y="0"/>
+          <a:ext cx="0" cy="0"/>
+          <a:chOff x="0" y="0"/>
+          <a:chExt cx="0" cy="0"/>
+        </a:xfrm>
+      </p:grpSpPr>
+      <p:sp xmlns:r="http://schemas.openxmlformats.org/officeDocument/2006/relationships">
+        <p:nvSpPr>
+          <p:cNvPr id="2" name="Title 1"/>
+          <p:cNvSpPr>
+            <a:spLocks noGrp="1"/>
+          </p:cNvSpPr>
+          <p:nvPr>
+            <p:ph type="title"/>
+          </p:nvPr>
+        </p:nvSpPr>
+        <p:spPr/>
+        <p:txBody>
+          <a:bodyPr/>
+          <a:lstStyle/>
+          <a:p>
+            <a:r>
+              <a:rPr lang="en-US" sz="5000">
+                <a:solidFill>
+                  <a:srgbClr val="FFFFFF"/>
+                </a:solidFill>
+              </a:rPr>
+              <a:t>Answer</a:t>
+            </a:r>
+          </a:p>
+        </p:txBody>
+      </p:sp>
+      <p:sp xmlns:r="http://schemas.openxmlformats.org/officeDocument/2006/relationships">
+        <p:nvSpPr>
+          <p:cNvPr id="3" name="Content Placeholder 2"/>
+          <p:cNvSpPr>
+            <a:spLocks noGrp="1"/>
+          </p:cNvSpPr>
+          <p:nvPr>
+            <p:ph idx="1"/>
+          </p:nvPr>
+        </p:nvSpPr>
+        <p:spPr/>
+        <p:txBody>
+          <a:bodyPr/>
+          <a:lstStyle/>
+          <a:p>
+            <a:r>
+              <a:rPr lang="en-US" sz="4000">
+                <a:solidFill>
+                  <a:srgbClr val="FFFFFF"/>
+                </a:solidFill>
+              </a:rPr>
+              <a:t>Market failure is the economic situation defined by an inefficient distribution of goods and services in the free market.</a:t>
             </a:r>
           </a:p>
         </p:txBody>
@@ -3141,7 +3299,7 @@
             <a:r>
               <a:rPr lang="en-US" sz="5000">
                 <a:solidFill>
-                  <a:srgbClr val="000000"/>
+                  <a:srgbClr val="FFFFFF"/>
                 </a:solidFill>
               </a:rPr>
               <a:t>Question 1</a:t>
@@ -3167,7 +3325,7 @@
             <a:r>
               <a:rPr lang="en-US" sz="4000">
                 <a:solidFill>
-                  <a:srgbClr val="000000"/>
+                  <a:srgbClr val="FFFFFF"/>
                 </a:solidFill>
               </a:rPr>
               <a:t>What is the Law of demand?</a:t>
@@ -3218,7 +3376,7 @@
             <a:r>
               <a:rPr lang="en-US" sz="5000">
                 <a:solidFill>
-                  <a:srgbClr val="000000"/>
+                  <a:srgbClr val="FFFFFF"/>
                 </a:solidFill>
               </a:rPr>
               <a:t>Answer</a:t>
@@ -3244,7 +3402,7 @@
             <a:r>
               <a:rPr lang="en-US" sz="4000">
                 <a:solidFill>
-                  <a:srgbClr val="000000"/>
+                  <a:srgbClr val="FFFFFF"/>
                 </a:solidFill>
               </a:rPr>
               <a:t>When the price of a good rises, the quantity of the good demanded will fall, ceteris paribus.</a:t>
@@ -3295,7 +3453,7 @@
             <a:r>
               <a:rPr lang="en-US" sz="5000">
                 <a:solidFill>
-                  <a:srgbClr val="000000"/>
+                  <a:srgbClr val="FFFFFF"/>
                 </a:solidFill>
               </a:rPr>
               <a:t>Question 2</a:t>
@@ -3321,7 +3479,7 @@
             <a:r>
               <a:rPr lang="en-US" sz="4000">
                 <a:solidFill>
-                  <a:srgbClr val="000000"/>
+                  <a:srgbClr val="FFFFFF"/>
                 </a:solidFill>
               </a:rPr>
               <a:t>What is the Law of supply?</a:t>
@@ -3372,7 +3530,7 @@
             <a:r>
               <a:rPr lang="en-US" sz="5000">
                 <a:solidFill>
-                  <a:srgbClr val="000000"/>
+                  <a:srgbClr val="FFFFFF"/>
                 </a:solidFill>
               </a:rPr>
               <a:t>Answer</a:t>
@@ -3398,7 +3556,7 @@
             <a:r>
               <a:rPr lang="en-US" sz="4000">
                 <a:solidFill>
-                  <a:srgbClr val="000000"/>
+                  <a:srgbClr val="FFFFFF"/>
                 </a:solidFill>
               </a:rPr>
               <a:t>When the price of a good increases, the quantity supplied increases, ceteris paribus.</a:t>
@@ -3449,7 +3607,7 @@
             <a:r>
               <a:rPr lang="en-US" sz="5000">
                 <a:solidFill>
-                  <a:srgbClr val="000000"/>
+                  <a:srgbClr val="FFFFFF"/>
                 </a:solidFill>
               </a:rPr>
               <a:t>Question 3</a:t>
@@ -3475,7 +3633,7 @@
             <a:r>
               <a:rPr lang="en-US" sz="4000">
                 <a:solidFill>
-                  <a:srgbClr val="000000"/>
+                  <a:srgbClr val="FFFFFF"/>
                 </a:solidFill>
               </a:rPr>
               <a:t>What is price elasticity of demand?</a:t>
@@ -3526,7 +3684,7 @@
             <a:r>
               <a:rPr lang="en-US" sz="5000">
                 <a:solidFill>
-                  <a:srgbClr val="000000"/>
+                  <a:srgbClr val="FFFFFF"/>
                 </a:solidFill>
               </a:rPr>
               <a:t>Answer</a:t>
@@ -3552,7 +3710,7 @@
             <a:r>
               <a:rPr lang="en-US" sz="4000">
                 <a:solidFill>
-                  <a:srgbClr val="000000"/>
+                  <a:srgbClr val="FFFFFF"/>
                 </a:solidFill>
               </a:rPr>
               <a:t>Percentage change in quantity demanded caused by a 1 percent change in price.</a:t>
@@ -3603,7 +3761,7 @@
             <a:r>
               <a:rPr lang="en-US" sz="5000">
                 <a:solidFill>
-                  <a:srgbClr val="000000"/>
+                  <a:srgbClr val="FFFFFF"/>
                 </a:solidFill>
               </a:rPr>
               <a:t>Question 4</a:t>
@@ -3629,7 +3787,7 @@
             <a:r>
               <a:rPr lang="en-US" sz="4000">
                 <a:solidFill>
-                  <a:srgbClr val="000000"/>
+                  <a:srgbClr val="FFFFFF"/>
                 </a:solidFill>
               </a:rPr>
               <a:t>What is price elasticity of supply?</a:t>
@@ -3680,7 +3838,7 @@
             <a:r>
               <a:rPr lang="en-US" sz="5000">
                 <a:solidFill>
-                  <a:srgbClr val="000000"/>
+                  <a:srgbClr val="FFFFFF"/>
                 </a:solidFill>
               </a:rPr>
               <a:t>Answer</a:t>
@@ -3706,7 +3864,7 @@
             <a:r>
               <a:rPr lang="en-US" sz="4000">
                 <a:solidFill>
-                  <a:srgbClr val="000000"/>
+                  <a:srgbClr val="FFFFFF"/>
                 </a:solidFill>
               </a:rPr>
               <a:t>Percentage change in quantity supplied caused by a 1 percent change in price.</a:t>

</xml_diff>

<commit_message>
Fixed logger merge issue in NormalParser and Ui
</commit_message>
<xml_diff>
--- a/pptx/Micro-Economics.pptx
+++ b/pptx/Micro-Economics.pptx
@@ -2551,7 +2551,7 @@
     <p:bg>
       <p:bgPr>
         <a:solidFill>
-          <a:srgbClr val="0000FF"/>
+          <a:srgbClr val="000080"/>
         </a:solidFill>
       </p:bgPr>
     </p:bg>
@@ -3094,7 +3094,7 @@
             <a:r>
               <a:rPr lang="en-US" sz="6000">
                 <a:solidFill>
-                  <a:srgbClr val="FFFFFF"/>
+                  <a:srgbClr val="A0522D"/>
                 </a:solidFill>
               </a:rPr>
               <a:t>Micro-Economics</a:t>
@@ -3145,7 +3145,7 @@
             <a:r>
               <a:rPr lang="en-US" sz="5000">
                 <a:solidFill>
-                  <a:srgbClr val="FFFFFF"/>
+                  <a:srgbClr val="A0522D"/>
                 </a:solidFill>
               </a:rPr>
               <a:t>Question 5</a:t>
@@ -3171,7 +3171,7 @@
             <a:r>
               <a:rPr lang="en-US" sz="4000">
                 <a:solidFill>
-                  <a:srgbClr val="FFFFFF"/>
+                  <a:srgbClr val="A0522D"/>
                 </a:solidFill>
               </a:rPr>
               <a:t>What is Market Failure?</a:t>
@@ -3222,7 +3222,7 @@
             <a:r>
               <a:rPr lang="en-US" sz="5000">
                 <a:solidFill>
-                  <a:srgbClr val="FFFFFF"/>
+                  <a:srgbClr val="A0522D"/>
                 </a:solidFill>
               </a:rPr>
               <a:t>Answer</a:t>
@@ -3248,7 +3248,7 @@
             <a:r>
               <a:rPr lang="en-US" sz="4000">
                 <a:solidFill>
-                  <a:srgbClr val="FFFFFF"/>
+                  <a:srgbClr val="A0522D"/>
                 </a:solidFill>
               </a:rPr>
               <a:t>Market failure is the economic situation defined by an inefficient distribution of goods and services in the free market.</a:t>
@@ -3299,7 +3299,7 @@
             <a:r>
               <a:rPr lang="en-US" sz="5000">
                 <a:solidFill>
-                  <a:srgbClr val="FFFFFF"/>
+                  <a:srgbClr val="A0522D"/>
                 </a:solidFill>
               </a:rPr>
               <a:t>Question 1</a:t>
@@ -3325,7 +3325,7 @@
             <a:r>
               <a:rPr lang="en-US" sz="4000">
                 <a:solidFill>
-                  <a:srgbClr val="FFFFFF"/>
+                  <a:srgbClr val="A0522D"/>
                 </a:solidFill>
               </a:rPr>
               <a:t>What is the Law of demand?</a:t>
@@ -3376,7 +3376,7 @@
             <a:r>
               <a:rPr lang="en-US" sz="5000">
                 <a:solidFill>
-                  <a:srgbClr val="FFFFFF"/>
+                  <a:srgbClr val="A0522D"/>
                 </a:solidFill>
               </a:rPr>
               <a:t>Answer</a:t>
@@ -3402,7 +3402,7 @@
             <a:r>
               <a:rPr lang="en-US" sz="4000">
                 <a:solidFill>
-                  <a:srgbClr val="FFFFFF"/>
+                  <a:srgbClr val="A0522D"/>
                 </a:solidFill>
               </a:rPr>
               <a:t>When the price of a good rises, the quantity of the good demanded will fall, ceteris paribus.</a:t>
@@ -3453,7 +3453,7 @@
             <a:r>
               <a:rPr lang="en-US" sz="5000">
                 <a:solidFill>
-                  <a:srgbClr val="FFFFFF"/>
+                  <a:srgbClr val="A0522D"/>
                 </a:solidFill>
               </a:rPr>
               <a:t>Question 2</a:t>
@@ -3479,7 +3479,7 @@
             <a:r>
               <a:rPr lang="en-US" sz="4000">
                 <a:solidFill>
-                  <a:srgbClr val="FFFFFF"/>
+                  <a:srgbClr val="A0522D"/>
                 </a:solidFill>
               </a:rPr>
               <a:t>What is the Law of supply?</a:t>
@@ -3530,7 +3530,7 @@
             <a:r>
               <a:rPr lang="en-US" sz="5000">
                 <a:solidFill>
-                  <a:srgbClr val="FFFFFF"/>
+                  <a:srgbClr val="A0522D"/>
                 </a:solidFill>
               </a:rPr>
               <a:t>Answer</a:t>
@@ -3556,7 +3556,7 @@
             <a:r>
               <a:rPr lang="en-US" sz="4000">
                 <a:solidFill>
-                  <a:srgbClr val="FFFFFF"/>
+                  <a:srgbClr val="A0522D"/>
                 </a:solidFill>
               </a:rPr>
               <a:t>When the price of a good increases, the quantity supplied increases, ceteris paribus.</a:t>
@@ -3607,7 +3607,7 @@
             <a:r>
               <a:rPr lang="en-US" sz="5000">
                 <a:solidFill>
-                  <a:srgbClr val="FFFFFF"/>
+                  <a:srgbClr val="A0522D"/>
                 </a:solidFill>
               </a:rPr>
               <a:t>Question 3</a:t>
@@ -3633,7 +3633,7 @@
             <a:r>
               <a:rPr lang="en-US" sz="4000">
                 <a:solidFill>
-                  <a:srgbClr val="FFFFFF"/>
+                  <a:srgbClr val="A0522D"/>
                 </a:solidFill>
               </a:rPr>
               <a:t>What is price elasticity of demand?</a:t>
@@ -3684,7 +3684,7 @@
             <a:r>
               <a:rPr lang="en-US" sz="5000">
                 <a:solidFill>
-                  <a:srgbClr val="FFFFFF"/>
+                  <a:srgbClr val="A0522D"/>
                 </a:solidFill>
               </a:rPr>
               <a:t>Answer</a:t>
@@ -3710,7 +3710,7 @@
             <a:r>
               <a:rPr lang="en-US" sz="4000">
                 <a:solidFill>
-                  <a:srgbClr val="FFFFFF"/>
+                  <a:srgbClr val="A0522D"/>
                 </a:solidFill>
               </a:rPr>
               <a:t>Percentage change in quantity demanded caused by a 1 percent change in price.</a:t>
@@ -3761,7 +3761,7 @@
             <a:r>
               <a:rPr lang="en-US" sz="5000">
                 <a:solidFill>
-                  <a:srgbClr val="FFFFFF"/>
+                  <a:srgbClr val="A0522D"/>
                 </a:solidFill>
               </a:rPr>
               <a:t>Question 4</a:t>
@@ -3787,7 +3787,7 @@
             <a:r>
               <a:rPr lang="en-US" sz="4000">
                 <a:solidFill>
-                  <a:srgbClr val="FFFFFF"/>
+                  <a:srgbClr val="A0522D"/>
                 </a:solidFill>
               </a:rPr>
               <a:t>What is price elasticity of supply?</a:t>
@@ -3838,7 +3838,7 @@
             <a:r>
               <a:rPr lang="en-US" sz="5000">
                 <a:solidFill>
-                  <a:srgbClr val="FFFFFF"/>
+                  <a:srgbClr val="A0522D"/>
                 </a:solidFill>
               </a:rPr>
               <a:t>Answer</a:t>
@@ -3864,7 +3864,7 @@
             <a:r>
               <a:rPr lang="en-US" sz="4000">
                 <a:solidFill>
-                  <a:srgbClr val="FFFFFF"/>
+                  <a:srgbClr val="A0522D"/>
                 </a:solidFill>
               </a:rPr>
               <a:t>Percentage change in quantity supplied caused by a 1 percent change in price.</a:t>

</xml_diff>

<commit_message>
Add Default Color Scheme options to pptx
</commit_message>
<xml_diff>
--- a/pptx/Micro-Economics.pptx
+++ b/pptx/Micro-Economics.pptx
@@ -2551,7 +2551,7 @@
     <p:bg>
       <p:bgPr>
         <a:solidFill>
-          <a:srgbClr val="000080"/>
+          <a:srgbClr val="A13942"/>
         </a:solidFill>
       </p:bgPr>
     </p:bg>
@@ -3094,7 +3094,7 @@
             <a:r>
               <a:rPr lang="en-US" sz="6000">
                 <a:solidFill>
-                  <a:srgbClr val="A0522D"/>
+                  <a:srgbClr val="BD8038"/>
                 </a:solidFill>
               </a:rPr>
               <a:t>Micro-Economics</a:t>
@@ -3145,7 +3145,7 @@
             <a:r>
               <a:rPr lang="en-US" sz="5000">
                 <a:solidFill>
-                  <a:srgbClr val="A0522D"/>
+                  <a:srgbClr val="BD8038"/>
                 </a:solidFill>
               </a:rPr>
               <a:t>Question 5</a:t>
@@ -3171,7 +3171,7 @@
             <a:r>
               <a:rPr lang="en-US" sz="4000">
                 <a:solidFill>
-                  <a:srgbClr val="A0522D"/>
+                  <a:srgbClr val="BD8038"/>
                 </a:solidFill>
               </a:rPr>
               <a:t>What is Market Failure?</a:t>
@@ -3222,7 +3222,7 @@
             <a:r>
               <a:rPr lang="en-US" sz="5000">
                 <a:solidFill>
-                  <a:srgbClr val="A0522D"/>
+                  <a:srgbClr val="BD8038"/>
                 </a:solidFill>
               </a:rPr>
               <a:t>Answer</a:t>
@@ -3248,7 +3248,7 @@
             <a:r>
               <a:rPr lang="en-US" sz="4000">
                 <a:solidFill>
-                  <a:srgbClr val="A0522D"/>
+                  <a:srgbClr val="BD8038"/>
                 </a:solidFill>
               </a:rPr>
               <a:t>Market failure is the economic situation defined by an inefficient distribution of goods and services in the free market.</a:t>
@@ -3299,7 +3299,7 @@
             <a:r>
               <a:rPr lang="en-US" sz="5000">
                 <a:solidFill>
-                  <a:srgbClr val="A0522D"/>
+                  <a:srgbClr val="BD8038"/>
                 </a:solidFill>
               </a:rPr>
               <a:t>Question 1</a:t>
@@ -3325,7 +3325,7 @@
             <a:r>
               <a:rPr lang="en-US" sz="4000">
                 <a:solidFill>
-                  <a:srgbClr val="A0522D"/>
+                  <a:srgbClr val="BD8038"/>
                 </a:solidFill>
               </a:rPr>
               <a:t>What is the Law of demand?</a:t>
@@ -3376,7 +3376,7 @@
             <a:r>
               <a:rPr lang="en-US" sz="5000">
                 <a:solidFill>
-                  <a:srgbClr val="A0522D"/>
+                  <a:srgbClr val="BD8038"/>
                 </a:solidFill>
               </a:rPr>
               <a:t>Answer</a:t>
@@ -3402,7 +3402,7 @@
             <a:r>
               <a:rPr lang="en-US" sz="4000">
                 <a:solidFill>
-                  <a:srgbClr val="A0522D"/>
+                  <a:srgbClr val="BD8038"/>
                 </a:solidFill>
               </a:rPr>
               <a:t>When the price of a good rises, the quantity of the good demanded will fall, ceteris paribus.</a:t>
@@ -3453,7 +3453,7 @@
             <a:r>
               <a:rPr lang="en-US" sz="5000">
                 <a:solidFill>
-                  <a:srgbClr val="A0522D"/>
+                  <a:srgbClr val="BD8038"/>
                 </a:solidFill>
               </a:rPr>
               <a:t>Question 2</a:t>
@@ -3479,7 +3479,7 @@
             <a:r>
               <a:rPr lang="en-US" sz="4000">
                 <a:solidFill>
-                  <a:srgbClr val="A0522D"/>
+                  <a:srgbClr val="BD8038"/>
                 </a:solidFill>
               </a:rPr>
               <a:t>What is the Law of supply?</a:t>
@@ -3530,7 +3530,7 @@
             <a:r>
               <a:rPr lang="en-US" sz="5000">
                 <a:solidFill>
-                  <a:srgbClr val="A0522D"/>
+                  <a:srgbClr val="BD8038"/>
                 </a:solidFill>
               </a:rPr>
               <a:t>Answer</a:t>
@@ -3556,7 +3556,7 @@
             <a:r>
               <a:rPr lang="en-US" sz="4000">
                 <a:solidFill>
-                  <a:srgbClr val="A0522D"/>
+                  <a:srgbClr val="BD8038"/>
                 </a:solidFill>
               </a:rPr>
               <a:t>When the price of a good increases, the quantity supplied increases, ceteris paribus.</a:t>
@@ -3607,7 +3607,7 @@
             <a:r>
               <a:rPr lang="en-US" sz="5000">
                 <a:solidFill>
-                  <a:srgbClr val="A0522D"/>
+                  <a:srgbClr val="BD8038"/>
                 </a:solidFill>
               </a:rPr>
               <a:t>Question 3</a:t>
@@ -3633,7 +3633,7 @@
             <a:r>
               <a:rPr lang="en-US" sz="4000">
                 <a:solidFill>
-                  <a:srgbClr val="A0522D"/>
+                  <a:srgbClr val="BD8038"/>
                 </a:solidFill>
               </a:rPr>
               <a:t>What is price elasticity of demand?</a:t>
@@ -3684,7 +3684,7 @@
             <a:r>
               <a:rPr lang="en-US" sz="5000">
                 <a:solidFill>
-                  <a:srgbClr val="A0522D"/>
+                  <a:srgbClr val="BD8038"/>
                 </a:solidFill>
               </a:rPr>
               <a:t>Answer</a:t>
@@ -3710,7 +3710,7 @@
             <a:r>
               <a:rPr lang="en-US" sz="4000">
                 <a:solidFill>
-                  <a:srgbClr val="A0522D"/>
+                  <a:srgbClr val="BD8038"/>
                 </a:solidFill>
               </a:rPr>
               <a:t>Percentage change in quantity demanded caused by a 1 percent change in price.</a:t>
@@ -3761,7 +3761,7 @@
             <a:r>
               <a:rPr lang="en-US" sz="5000">
                 <a:solidFill>
-                  <a:srgbClr val="A0522D"/>
+                  <a:srgbClr val="BD8038"/>
                 </a:solidFill>
               </a:rPr>
               <a:t>Question 4</a:t>
@@ -3787,7 +3787,7 @@
             <a:r>
               <a:rPr lang="en-US" sz="4000">
                 <a:solidFill>
-                  <a:srgbClr val="A0522D"/>
+                  <a:srgbClr val="BD8038"/>
                 </a:solidFill>
               </a:rPr>
               <a:t>What is price elasticity of supply?</a:t>
@@ -3838,7 +3838,7 @@
             <a:r>
               <a:rPr lang="en-US" sz="5000">
                 <a:solidFill>
-                  <a:srgbClr val="A0522D"/>
+                  <a:srgbClr val="BD8038"/>
                 </a:solidFill>
               </a:rPr>
               <a:t>Answer</a:t>
@@ -3864,7 +3864,7 @@
             <a:r>
               <a:rPr lang="en-US" sz="4000">
                 <a:solidFill>
-                  <a:srgbClr val="A0522D"/>
+                  <a:srgbClr val="BD8038"/>
                 </a:solidFill>
               </a:rPr>
               <a:t>Percentage change in quantity supplied caused by a 1 percent change in price.</a:t>

</xml_diff>

<commit_message>
Fixed help printing issue
</commit_message>
<xml_diff>
--- a/pptx/Micro-Economics.pptx
+++ b/pptx/Micro-Economics.pptx
@@ -5,17 +5,18 @@
     <p:sldMasterId id="2147483648" r:id="rId1"/>
   </p:sldMasterIdLst>
   <p:sldIdLst>
-    <p:sldId id="256" r:id="rId6"/>
-    <p:sldId id="257" r:id="rId7"/>
-    <p:sldId id="258" r:id="rId8"/>
-    <p:sldId id="259" r:id="rId9"/>
-    <p:sldId id="260" r:id="rId10"/>
-    <p:sldId id="261" r:id="rId11"/>
-    <p:sldId id="262" r:id="rId12"/>
-    <p:sldId id="263" r:id="rId13"/>
-    <p:sldId id="264" r:id="rId14"/>
-    <p:sldId id="265" r:id="rId15"/>
-    <p:sldId id="266" r:id="rId16"/>
+    <p:sldId id="256" r:id="rId2"/>
+    <p:sldId id="267" r:id="rId3"/>
+    <p:sldId id="257" r:id="rId4"/>
+    <p:sldId id="258" r:id="rId5"/>
+    <p:sldId id="259" r:id="rId6"/>
+    <p:sldId id="260" r:id="rId7"/>
+    <p:sldId id="261" r:id="rId8"/>
+    <p:sldId id="262" r:id="rId9"/>
+    <p:sldId id="263" r:id="rId10"/>
+    <p:sldId id="264" r:id="rId11"/>
+    <p:sldId id="265" r:id="rId12"/>
+    <p:sldId id="266" r:id="rId13"/>
   </p:sldIdLst>
   <p:sldSz cx="9144000" cy="6858000" type="screen4x3"/>
   <p:notesSz cx="6858000" cy="9144000"/>
@@ -114,7 +115,75 @@
       </a:defRPr>
     </a:lvl9pPr>
   </p:defaultTextStyle>
+  <p:extLst>
+    <p:ext uri="{EFAFB233-063F-42B5-8137-9DF3F51BA10A}">
+      <p15:sldGuideLst xmlns:p15="http://schemas.microsoft.com/office/powerpoint/2012/main">
+        <p15:guide id="1" orient="horz" pos="2160">
+          <p15:clr>
+            <a:srgbClr val="A4A3A4"/>
+          </p15:clr>
+        </p15:guide>
+        <p15:guide id="2" pos="2880">
+          <p15:clr>
+            <a:srgbClr val="A4A3A4"/>
+          </p15:clr>
+        </p15:guide>
+      </p15:sldGuideLst>
+    </p:ext>
+  </p:extLst>
 </p:presentation>
+</file>
+
+<file path=ppt/revisionInfo.xml><?xml version="1.0" encoding="utf-8"?>
+<p1510:revInfo xmlns:a="http://schemas.openxmlformats.org/drawingml/2006/main" xmlns:r="http://schemas.openxmlformats.org/officeDocument/2006/relationships" xmlns:p1510="http://schemas.microsoft.com/office/powerpoint/2015/10/main">
+  <p1510:revLst>
+    <p1510:client id="{7BCC8C13-92DD-481A-8CF1-19C4CD49A7A8}" v="3" dt="2020-11-06T11:47:59.339"/>
+  </p1510:revLst>
+</p1510:revInfo>
+</file>
+
+<file path=ppt/changesInfos/changesInfo1.xml><?xml version="1.0" encoding="utf-8"?>
+<pc:chgInfo xmlns:a="http://schemas.openxmlformats.org/drawingml/2006/main" xmlns:r="http://schemas.openxmlformats.org/officeDocument/2006/relationships" xmlns:ac="http://schemas.microsoft.com/office/drawing/2013/main/command" xmlns:pc="http://schemas.microsoft.com/office/powerpoint/2013/main/command">
+  <pc:docChgLst>
+    <pc:chgData name="Liau Kai Jie" userId="cf0b92f63fadee38" providerId="LiveId" clId="{7BCC8C13-92DD-481A-8CF1-19C4CD49A7A8}"/>
+    <pc:docChg chg="custSel addSld modSld">
+      <pc:chgData name="Liau Kai Jie" userId="cf0b92f63fadee38" providerId="LiveId" clId="{7BCC8C13-92DD-481A-8CF1-19C4CD49A7A8}" dt="2020-11-06T11:50:12.788" v="10" actId="1076"/>
+      <pc:docMkLst>
+        <pc:docMk/>
+      </pc:docMkLst>
+      <pc:sldChg chg="addSp modSp mod">
+        <pc:chgData name="Liau Kai Jie" userId="cf0b92f63fadee38" providerId="LiveId" clId="{7BCC8C13-92DD-481A-8CF1-19C4CD49A7A8}" dt="2020-11-06T11:50:12.788" v="10" actId="1076"/>
+        <pc:sldMkLst>
+          <pc:docMk/>
+          <pc:sldMk cId="0" sldId="256"/>
+        </pc:sldMkLst>
+        <pc:picChg chg="add mod">
+          <ac:chgData name="Liau Kai Jie" userId="cf0b92f63fadee38" providerId="LiveId" clId="{7BCC8C13-92DD-481A-8CF1-19C4CD49A7A8}" dt="2020-11-06T11:50:12.788" v="10" actId="1076"/>
+          <ac:picMkLst>
+            <pc:docMk/>
+            <pc:sldMk cId="0" sldId="256"/>
+            <ac:picMk id="4" creationId="{3516E81F-258F-43FA-A31A-089E5595BBF5}"/>
+          </ac:picMkLst>
+        </pc:picChg>
+      </pc:sldChg>
+      <pc:sldChg chg="addSp delSp modSp new mod">
+        <pc:chgData name="Liau Kai Jie" userId="cf0b92f63fadee38" providerId="LiveId" clId="{7BCC8C13-92DD-481A-8CF1-19C4CD49A7A8}" dt="2020-11-06T11:48:05.298" v="9" actId="21"/>
+        <pc:sldMkLst>
+          <pc:docMk/>
+          <pc:sldMk cId="853432824" sldId="267"/>
+        </pc:sldMkLst>
+        <pc:picChg chg="add del mod">
+          <ac:chgData name="Liau Kai Jie" userId="cf0b92f63fadee38" providerId="LiveId" clId="{7BCC8C13-92DD-481A-8CF1-19C4CD49A7A8}" dt="2020-11-06T11:48:05.298" v="9" actId="21"/>
+          <ac:picMkLst>
+            <pc:docMk/>
+            <pc:sldMk cId="853432824" sldId="267"/>
+            <ac:picMk id="4" creationId="{FA6BF468-F076-473F-B9EF-C091DD30FFF4}"/>
+          </ac:picMkLst>
+        </pc:picChg>
+      </pc:sldChg>
+    </pc:docChg>
+  </pc:docChgLst>
+</pc:chgInfo>
 </file>
 
 <file path=ppt/slideLayouts/slideLayout1.xml><?xml version="1.0" encoding="utf-8"?>
@@ -155,10 +224,9 @@
           <a:lstStyle/>
           <a:p>
             <a:r>
-              <a:rPr lang="en-US" smtClean="0"/>
+              <a:rPr lang="en-US"/>
               <a:t>Click to edit Master title style</a:t>
             </a:r>
-            <a:endParaRPr lang="en-US"/>
           </a:p>
         </p:txBody>
       </p:sp>
@@ -274,10 +342,9 @@
           </a:lstStyle>
           <a:p>
             <a:r>
-              <a:rPr lang="en-US" smtClean="0"/>
+              <a:rPr lang="en-US"/>
               <a:t>Click to edit Master subtitle style</a:t>
             </a:r>
-            <a:endParaRPr lang="en-US"/>
           </a:p>
         </p:txBody>
       </p:sp>
@@ -299,7 +366,7 @@
             <a:fld id="{1D8BD707-D9CF-40AE-B4C6-C98DA3205C09}" type="datetimeFigureOut">
               <a:rPr lang="en-US" smtClean="0"/>
               <a:pPr/>
-              <a:t>8/1/2011</a:t>
+              <a:t>11/6/2020</a:t>
             </a:fld>
             <a:endParaRPr lang="en-US"/>
           </a:p>
@@ -389,10 +456,9 @@
           <a:lstStyle/>
           <a:p>
             <a:r>
-              <a:rPr lang="en-US" smtClean="0"/>
+              <a:rPr lang="en-US"/>
               <a:t>Click to edit Master title style</a:t>
             </a:r>
-            <a:endParaRPr lang="en-US"/>
           </a:p>
         </p:txBody>
       </p:sp>
@@ -413,38 +479,37 @@
           <a:p>
             <a:pPr lvl="0"/>
             <a:r>
-              <a:rPr lang="en-US" smtClean="0"/>
+              <a:rPr lang="en-US"/>
               <a:t>Click to edit Master text styles</a:t>
             </a:r>
           </a:p>
           <a:p>
             <a:pPr lvl="1"/>
             <a:r>
-              <a:rPr lang="en-US" smtClean="0"/>
+              <a:rPr lang="en-US"/>
               <a:t>Second level</a:t>
             </a:r>
           </a:p>
           <a:p>
             <a:pPr lvl="2"/>
             <a:r>
-              <a:rPr lang="en-US" smtClean="0"/>
+              <a:rPr lang="en-US"/>
               <a:t>Third level</a:t>
             </a:r>
           </a:p>
           <a:p>
             <a:pPr lvl="3"/>
             <a:r>
-              <a:rPr lang="en-US" smtClean="0"/>
+              <a:rPr lang="en-US"/>
               <a:t>Fourth level</a:t>
             </a:r>
           </a:p>
           <a:p>
             <a:pPr lvl="4"/>
             <a:r>
-              <a:rPr lang="en-US" smtClean="0"/>
+              <a:rPr lang="en-US"/>
               <a:t>Fifth level</a:t>
             </a:r>
-            <a:endParaRPr lang="en-US"/>
           </a:p>
         </p:txBody>
       </p:sp>
@@ -466,7 +531,7 @@
             <a:fld id="{1D8BD707-D9CF-40AE-B4C6-C98DA3205C09}" type="datetimeFigureOut">
               <a:rPr lang="en-US" smtClean="0"/>
               <a:pPr/>
-              <a:t>8/1/2011</a:t>
+              <a:t>11/6/2020</a:t>
             </a:fld>
             <a:endParaRPr lang="en-US"/>
           </a:p>
@@ -561,10 +626,9 @@
           <a:lstStyle/>
           <a:p>
             <a:r>
-              <a:rPr lang="en-US" smtClean="0"/>
+              <a:rPr lang="en-US"/>
               <a:t>Click to edit Master title style</a:t>
             </a:r>
-            <a:endParaRPr lang="en-US"/>
           </a:p>
         </p:txBody>
       </p:sp>
@@ -590,38 +654,37 @@
           <a:p>
             <a:pPr lvl="0"/>
             <a:r>
-              <a:rPr lang="en-US" smtClean="0"/>
+              <a:rPr lang="en-US"/>
               <a:t>Click to edit Master text styles</a:t>
             </a:r>
           </a:p>
           <a:p>
             <a:pPr lvl="1"/>
             <a:r>
-              <a:rPr lang="en-US" smtClean="0"/>
+              <a:rPr lang="en-US"/>
               <a:t>Second level</a:t>
             </a:r>
           </a:p>
           <a:p>
             <a:pPr lvl="2"/>
             <a:r>
-              <a:rPr lang="en-US" smtClean="0"/>
+              <a:rPr lang="en-US"/>
               <a:t>Third level</a:t>
             </a:r>
           </a:p>
           <a:p>
             <a:pPr lvl="3"/>
             <a:r>
-              <a:rPr lang="en-US" smtClean="0"/>
+              <a:rPr lang="en-US"/>
               <a:t>Fourth level</a:t>
             </a:r>
           </a:p>
           <a:p>
             <a:pPr lvl="4"/>
             <a:r>
-              <a:rPr lang="en-US" smtClean="0"/>
+              <a:rPr lang="en-US"/>
               <a:t>Fifth level</a:t>
             </a:r>
-            <a:endParaRPr lang="en-US"/>
           </a:p>
         </p:txBody>
       </p:sp>
@@ -643,7 +706,7 @@
             <a:fld id="{1D8BD707-D9CF-40AE-B4C6-C98DA3205C09}" type="datetimeFigureOut">
               <a:rPr lang="en-US" smtClean="0"/>
               <a:pPr/>
-              <a:t>8/1/2011</a:t>
+              <a:t>11/6/2020</a:t>
             </a:fld>
             <a:endParaRPr lang="en-US"/>
           </a:p>
@@ -733,10 +796,9 @@
           <a:lstStyle/>
           <a:p>
             <a:r>
-              <a:rPr lang="en-US" smtClean="0"/>
+              <a:rPr lang="en-US"/>
               <a:t>Click to edit Master title style</a:t>
             </a:r>
-            <a:endParaRPr lang="en-US"/>
           </a:p>
         </p:txBody>
       </p:sp>
@@ -757,38 +819,37 @@
           <a:p>
             <a:pPr lvl="0"/>
             <a:r>
-              <a:rPr lang="en-US" smtClean="0"/>
+              <a:rPr lang="en-US"/>
               <a:t>Click to edit Master text styles</a:t>
             </a:r>
           </a:p>
           <a:p>
             <a:pPr lvl="1"/>
             <a:r>
-              <a:rPr lang="en-US" smtClean="0"/>
+              <a:rPr lang="en-US"/>
               <a:t>Second level</a:t>
             </a:r>
           </a:p>
           <a:p>
             <a:pPr lvl="2"/>
             <a:r>
-              <a:rPr lang="en-US" smtClean="0"/>
+              <a:rPr lang="en-US"/>
               <a:t>Third level</a:t>
             </a:r>
           </a:p>
           <a:p>
             <a:pPr lvl="3"/>
             <a:r>
-              <a:rPr lang="en-US" smtClean="0"/>
+              <a:rPr lang="en-US"/>
               <a:t>Fourth level</a:t>
             </a:r>
           </a:p>
           <a:p>
             <a:pPr lvl="4"/>
             <a:r>
-              <a:rPr lang="en-US" smtClean="0"/>
+              <a:rPr lang="en-US"/>
               <a:t>Fifth level</a:t>
             </a:r>
-            <a:endParaRPr lang="en-US"/>
           </a:p>
         </p:txBody>
       </p:sp>
@@ -810,7 +871,7 @@
             <a:fld id="{1D8BD707-D9CF-40AE-B4C6-C98DA3205C09}" type="datetimeFigureOut">
               <a:rPr lang="en-US" smtClean="0"/>
               <a:pPr/>
-              <a:t>8/1/2011</a:t>
+              <a:t>11/6/2020</a:t>
             </a:fld>
             <a:endParaRPr lang="en-US"/>
           </a:p>
@@ -909,10 +970,9 @@
           </a:lstStyle>
           <a:p>
             <a:r>
-              <a:rPr lang="en-US" smtClean="0"/>
+              <a:rPr lang="en-US"/>
               <a:t>Click to edit Master title style</a:t>
             </a:r>
-            <a:endParaRPr lang="en-US"/>
           </a:p>
         </p:txBody>
       </p:sp>
@@ -1029,7 +1089,7 @@
           <a:p>
             <a:pPr lvl="0"/>
             <a:r>
-              <a:rPr lang="en-US" smtClean="0"/>
+              <a:rPr lang="en-US"/>
               <a:t>Click to edit Master text styles</a:t>
             </a:r>
           </a:p>
@@ -1053,7 +1113,7 @@
             <a:fld id="{1D8BD707-D9CF-40AE-B4C6-C98DA3205C09}" type="datetimeFigureOut">
               <a:rPr lang="en-US" smtClean="0"/>
               <a:pPr/>
-              <a:t>8/1/2011</a:t>
+              <a:t>11/6/2020</a:t>
             </a:fld>
             <a:endParaRPr lang="en-US"/>
           </a:p>
@@ -1143,10 +1203,9 @@
           <a:lstStyle/>
           <a:p>
             <a:r>
-              <a:rPr lang="en-US" smtClean="0"/>
+              <a:rPr lang="en-US"/>
               <a:t>Click to edit Master title style</a:t>
             </a:r>
-            <a:endParaRPr lang="en-US"/>
           </a:p>
         </p:txBody>
       </p:sp>
@@ -1200,38 +1259,37 @@
           <a:p>
             <a:pPr lvl="0"/>
             <a:r>
-              <a:rPr lang="en-US" smtClean="0"/>
+              <a:rPr lang="en-US"/>
               <a:t>Click to edit Master text styles</a:t>
             </a:r>
           </a:p>
           <a:p>
             <a:pPr lvl="1"/>
             <a:r>
-              <a:rPr lang="en-US" smtClean="0"/>
+              <a:rPr lang="en-US"/>
               <a:t>Second level</a:t>
             </a:r>
           </a:p>
           <a:p>
             <a:pPr lvl="2"/>
             <a:r>
-              <a:rPr lang="en-US" smtClean="0"/>
+              <a:rPr lang="en-US"/>
               <a:t>Third level</a:t>
             </a:r>
           </a:p>
           <a:p>
             <a:pPr lvl="3"/>
             <a:r>
-              <a:rPr lang="en-US" smtClean="0"/>
+              <a:rPr lang="en-US"/>
               <a:t>Fourth level</a:t>
             </a:r>
           </a:p>
           <a:p>
             <a:pPr lvl="4"/>
             <a:r>
-              <a:rPr lang="en-US" smtClean="0"/>
+              <a:rPr lang="en-US"/>
               <a:t>Fifth level</a:t>
             </a:r>
-            <a:endParaRPr lang="en-US"/>
           </a:p>
         </p:txBody>
       </p:sp>
@@ -1285,38 +1343,37 @@
           <a:p>
             <a:pPr lvl="0"/>
             <a:r>
-              <a:rPr lang="en-US" smtClean="0"/>
+              <a:rPr lang="en-US"/>
               <a:t>Click to edit Master text styles</a:t>
             </a:r>
           </a:p>
           <a:p>
             <a:pPr lvl="1"/>
             <a:r>
-              <a:rPr lang="en-US" smtClean="0"/>
+              <a:rPr lang="en-US"/>
               <a:t>Second level</a:t>
             </a:r>
           </a:p>
           <a:p>
             <a:pPr lvl="2"/>
             <a:r>
-              <a:rPr lang="en-US" smtClean="0"/>
+              <a:rPr lang="en-US"/>
               <a:t>Third level</a:t>
             </a:r>
           </a:p>
           <a:p>
             <a:pPr lvl="3"/>
             <a:r>
-              <a:rPr lang="en-US" smtClean="0"/>
+              <a:rPr lang="en-US"/>
               <a:t>Fourth level</a:t>
             </a:r>
           </a:p>
           <a:p>
             <a:pPr lvl="4"/>
             <a:r>
-              <a:rPr lang="en-US" smtClean="0"/>
+              <a:rPr lang="en-US"/>
               <a:t>Fifth level</a:t>
             </a:r>
-            <a:endParaRPr lang="en-US"/>
           </a:p>
         </p:txBody>
       </p:sp>
@@ -1338,7 +1395,7 @@
             <a:fld id="{1D8BD707-D9CF-40AE-B4C6-C98DA3205C09}" type="datetimeFigureOut">
               <a:rPr lang="en-US" smtClean="0"/>
               <a:pPr/>
-              <a:t>8/1/2011</a:t>
+              <a:t>11/6/2020</a:t>
             </a:fld>
             <a:endParaRPr lang="en-US"/>
           </a:p>
@@ -1432,10 +1489,9 @@
           </a:lstStyle>
           <a:p>
             <a:r>
-              <a:rPr lang="en-US" smtClean="0"/>
+              <a:rPr lang="en-US"/>
               <a:t>Click to edit Master title style</a:t>
             </a:r>
-            <a:endParaRPr lang="en-US"/>
           </a:p>
         </p:txBody>
       </p:sp>
@@ -1498,7 +1554,7 @@
           <a:p>
             <a:pPr lvl="0"/>
             <a:r>
-              <a:rPr lang="en-US" smtClean="0"/>
+              <a:rPr lang="en-US"/>
               <a:t>Click to edit Master text styles</a:t>
             </a:r>
           </a:p>
@@ -1554,38 +1610,37 @@
           <a:p>
             <a:pPr lvl="0"/>
             <a:r>
-              <a:rPr lang="en-US" smtClean="0"/>
+              <a:rPr lang="en-US"/>
               <a:t>Click to edit Master text styles</a:t>
             </a:r>
           </a:p>
           <a:p>
             <a:pPr lvl="1"/>
             <a:r>
-              <a:rPr lang="en-US" smtClean="0"/>
+              <a:rPr lang="en-US"/>
               <a:t>Second level</a:t>
             </a:r>
           </a:p>
           <a:p>
             <a:pPr lvl="2"/>
             <a:r>
-              <a:rPr lang="en-US" smtClean="0"/>
+              <a:rPr lang="en-US"/>
               <a:t>Third level</a:t>
             </a:r>
           </a:p>
           <a:p>
             <a:pPr lvl="3"/>
             <a:r>
-              <a:rPr lang="en-US" smtClean="0"/>
+              <a:rPr lang="en-US"/>
               <a:t>Fourth level</a:t>
             </a:r>
           </a:p>
           <a:p>
             <a:pPr lvl="4"/>
             <a:r>
-              <a:rPr lang="en-US" smtClean="0"/>
+              <a:rPr lang="en-US"/>
               <a:t>Fifth level</a:t>
             </a:r>
-            <a:endParaRPr lang="en-US"/>
           </a:p>
         </p:txBody>
       </p:sp>
@@ -1648,7 +1703,7 @@
           <a:p>
             <a:pPr lvl="0"/>
             <a:r>
-              <a:rPr lang="en-US" smtClean="0"/>
+              <a:rPr lang="en-US"/>
               <a:t>Click to edit Master text styles</a:t>
             </a:r>
           </a:p>
@@ -1704,38 +1759,37 @@
           <a:p>
             <a:pPr lvl="0"/>
             <a:r>
-              <a:rPr lang="en-US" smtClean="0"/>
+              <a:rPr lang="en-US"/>
               <a:t>Click to edit Master text styles</a:t>
             </a:r>
           </a:p>
           <a:p>
             <a:pPr lvl="1"/>
             <a:r>
-              <a:rPr lang="en-US" smtClean="0"/>
+              <a:rPr lang="en-US"/>
               <a:t>Second level</a:t>
             </a:r>
           </a:p>
           <a:p>
             <a:pPr lvl="2"/>
             <a:r>
-              <a:rPr lang="en-US" smtClean="0"/>
+              <a:rPr lang="en-US"/>
               <a:t>Third level</a:t>
             </a:r>
           </a:p>
           <a:p>
             <a:pPr lvl="3"/>
             <a:r>
-              <a:rPr lang="en-US" smtClean="0"/>
+              <a:rPr lang="en-US"/>
               <a:t>Fourth level</a:t>
             </a:r>
           </a:p>
           <a:p>
             <a:pPr lvl="4"/>
             <a:r>
-              <a:rPr lang="en-US" smtClean="0"/>
+              <a:rPr lang="en-US"/>
               <a:t>Fifth level</a:t>
             </a:r>
-            <a:endParaRPr lang="en-US"/>
           </a:p>
         </p:txBody>
       </p:sp>
@@ -1757,7 +1811,7 @@
             <a:fld id="{1D8BD707-D9CF-40AE-B4C6-C98DA3205C09}" type="datetimeFigureOut">
               <a:rPr lang="en-US" smtClean="0"/>
               <a:pPr/>
-              <a:t>8/1/2011</a:t>
+              <a:t>11/6/2020</a:t>
             </a:fld>
             <a:endParaRPr lang="en-US"/>
           </a:p>
@@ -1847,10 +1901,9 @@
           <a:lstStyle/>
           <a:p>
             <a:r>
-              <a:rPr lang="en-US" smtClean="0"/>
+              <a:rPr lang="en-US"/>
               <a:t>Click to edit Master title style</a:t>
             </a:r>
-            <a:endParaRPr lang="en-US"/>
           </a:p>
         </p:txBody>
       </p:sp>
@@ -1872,7 +1925,7 @@
             <a:fld id="{1D8BD707-D9CF-40AE-B4C6-C98DA3205C09}" type="datetimeFigureOut">
               <a:rPr lang="en-US" smtClean="0"/>
               <a:pPr/>
-              <a:t>8/1/2011</a:t>
+              <a:t>11/6/2020</a:t>
             </a:fld>
             <a:endParaRPr lang="en-US"/>
           </a:p>
@@ -1964,7 +2017,7 @@
             <a:fld id="{1D8BD707-D9CF-40AE-B4C6-C98DA3205C09}" type="datetimeFigureOut">
               <a:rPr lang="en-US" smtClean="0"/>
               <a:pPr/>
-              <a:t>8/1/2011</a:t>
+              <a:t>11/6/2020</a:t>
             </a:fld>
             <a:endParaRPr lang="en-US"/>
           </a:p>
@@ -2063,10 +2116,9 @@
           </a:lstStyle>
           <a:p>
             <a:r>
-              <a:rPr lang="en-US" smtClean="0"/>
+              <a:rPr lang="en-US"/>
               <a:t>Click to edit Master title style</a:t>
             </a:r>
-            <a:endParaRPr lang="en-US"/>
           </a:p>
         </p:txBody>
       </p:sp>
@@ -2120,38 +2172,37 @@
           <a:p>
             <a:pPr lvl="0"/>
             <a:r>
-              <a:rPr lang="en-US" smtClean="0"/>
+              <a:rPr lang="en-US"/>
               <a:t>Click to edit Master text styles</a:t>
             </a:r>
           </a:p>
           <a:p>
             <a:pPr lvl="1"/>
             <a:r>
-              <a:rPr lang="en-US" smtClean="0"/>
+              <a:rPr lang="en-US"/>
               <a:t>Second level</a:t>
             </a:r>
           </a:p>
           <a:p>
             <a:pPr lvl="2"/>
             <a:r>
-              <a:rPr lang="en-US" smtClean="0"/>
+              <a:rPr lang="en-US"/>
               <a:t>Third level</a:t>
             </a:r>
           </a:p>
           <a:p>
             <a:pPr lvl="3"/>
             <a:r>
-              <a:rPr lang="en-US" smtClean="0"/>
+              <a:rPr lang="en-US"/>
               <a:t>Fourth level</a:t>
             </a:r>
           </a:p>
           <a:p>
             <a:pPr lvl="4"/>
             <a:r>
-              <a:rPr lang="en-US" smtClean="0"/>
+              <a:rPr lang="en-US"/>
               <a:t>Fifth level</a:t>
             </a:r>
-            <a:endParaRPr lang="en-US"/>
           </a:p>
         </p:txBody>
       </p:sp>
@@ -2214,7 +2265,7 @@
           <a:p>
             <a:pPr lvl="0"/>
             <a:r>
-              <a:rPr lang="en-US" smtClean="0"/>
+              <a:rPr lang="en-US"/>
               <a:t>Click to edit Master text styles</a:t>
             </a:r>
           </a:p>
@@ -2238,7 +2289,7 @@
             <a:fld id="{1D8BD707-D9CF-40AE-B4C6-C98DA3205C09}" type="datetimeFigureOut">
               <a:rPr lang="en-US" smtClean="0"/>
               <a:pPr/>
-              <a:t>8/1/2011</a:t>
+              <a:t>11/6/2020</a:t>
             </a:fld>
             <a:endParaRPr lang="en-US"/>
           </a:p>
@@ -2337,10 +2388,9 @@
           </a:lstStyle>
           <a:p>
             <a:r>
-              <a:rPr lang="en-US" smtClean="0"/>
+              <a:rPr lang="en-US"/>
               <a:t>Click to edit Master title style</a:t>
             </a:r>
-            <a:endParaRPr lang="en-US"/>
           </a:p>
         </p:txBody>
       </p:sp>
@@ -2464,7 +2514,7 @@
           <a:p>
             <a:pPr lvl="0"/>
             <a:r>
-              <a:rPr lang="en-US" smtClean="0"/>
+              <a:rPr lang="en-US"/>
               <a:t>Click to edit Master text styles</a:t>
             </a:r>
           </a:p>
@@ -2488,7 +2538,7 @@
             <a:fld id="{1D8BD707-D9CF-40AE-B4C6-C98DA3205C09}" type="datetimeFigureOut">
               <a:rPr lang="en-US" smtClean="0"/>
               <a:pPr/>
-              <a:t>8/1/2011</a:t>
+              <a:t>11/6/2020</a:t>
             </a:fld>
             <a:endParaRPr lang="en-US"/>
           </a:p>
@@ -2551,8 +2601,9 @@
     <p:bg>
       <p:bgPr>
         <a:solidFill>
-          <a:srgbClr val="A13942"/>
+          <a:srgbClr val="FAEBEF"/>
         </a:solidFill>
+        <a:effectLst/>
       </p:bgPr>
     </p:bg>
     <p:spTree>
@@ -2595,10 +2646,9 @@
           <a:lstStyle/>
           <a:p>
             <a:r>
-              <a:rPr lang="en-US" smtClean="0"/>
+              <a:rPr lang="en-US"/>
               <a:t>Click to edit Master title style</a:t>
             </a:r>
-            <a:endParaRPr lang="en-US"/>
           </a:p>
         </p:txBody>
       </p:sp>
@@ -2629,38 +2679,37 @@
           <a:p>
             <a:pPr lvl="0"/>
             <a:r>
-              <a:rPr lang="en-US" smtClean="0"/>
+              <a:rPr lang="en-US"/>
               <a:t>Click to edit Master text styles</a:t>
             </a:r>
           </a:p>
           <a:p>
             <a:pPr lvl="1"/>
             <a:r>
-              <a:rPr lang="en-US" smtClean="0"/>
+              <a:rPr lang="en-US"/>
               <a:t>Second level</a:t>
             </a:r>
           </a:p>
           <a:p>
             <a:pPr lvl="2"/>
             <a:r>
-              <a:rPr lang="en-US" smtClean="0"/>
+              <a:rPr lang="en-US"/>
               <a:t>Third level</a:t>
             </a:r>
           </a:p>
           <a:p>
             <a:pPr lvl="3"/>
             <a:r>
-              <a:rPr lang="en-US" smtClean="0"/>
+              <a:rPr lang="en-US"/>
               <a:t>Fourth level</a:t>
             </a:r>
           </a:p>
           <a:p>
             <a:pPr lvl="4"/>
             <a:r>
-              <a:rPr lang="en-US" smtClean="0"/>
+              <a:rPr lang="en-US"/>
               <a:t>Fifth level</a:t>
             </a:r>
-            <a:endParaRPr lang="en-US"/>
           </a:p>
         </p:txBody>
       </p:sp>
@@ -2700,7 +2749,7 @@
             <a:fld id="{1D8BD707-D9CF-40AE-B4C6-C98DA3205C09}" type="datetimeFigureOut">
               <a:rPr lang="en-US" smtClean="0"/>
               <a:pPr/>
-              <a:t>8/1/2011</a:t>
+              <a:t>11/6/2020</a:t>
             </a:fld>
             <a:endParaRPr lang="en-US"/>
           </a:p>
@@ -3055,7 +3104,7 @@
 </file>
 
 <file path=ppt/slides/slide1.xml><?xml version="1.0" encoding="utf-8"?>
-<p:sld xmlns:p="http://schemas.openxmlformats.org/presentationml/2006/main" xmlns:a="http://schemas.openxmlformats.org/drawingml/2006/main">
+<p:sld xmlns:a="http://schemas.openxmlformats.org/drawingml/2006/main" xmlns:r="http://schemas.openxmlformats.org/officeDocument/2006/relationships" xmlns:p="http://schemas.openxmlformats.org/presentationml/2006/main">
   <p:cSld>
     <p:spTree>
       <p:nvGrpSpPr>
@@ -3071,7 +3120,7 @@
           <a:chExt cx="0" cy="0"/>
         </a:xfrm>
       </p:grpSpPr>
-      <p:sp xmlns:r="http://schemas.openxmlformats.org/officeDocument/2006/relationships">
+      <p:sp>
         <p:nvSpPr>
           <p:cNvPr id="2" name="Title 1"/>
           <p:cNvSpPr>
@@ -3094,7 +3143,7 @@
             <a:r>
               <a:rPr lang="en-US" sz="6000">
                 <a:solidFill>
-                  <a:srgbClr val="BD8038"/>
+                  <a:srgbClr val="2E3E80"/>
                 </a:solidFill>
               </a:rPr>
               <a:t>Micro-Economics</a:t>
@@ -3102,6 +3151,51 @@
           </a:p>
         </p:txBody>
       </p:sp>
+      <p:pic>
+        <p:nvPicPr>
+          <p:cNvPr id="4" name="Picture 3" descr="Table&#10;&#10;Description automatically generated">
+            <a:extLst>
+              <a:ext uri="{FF2B5EF4-FFF2-40B4-BE49-F238E27FC236}">
+                <a16:creationId xmlns:a16="http://schemas.microsoft.com/office/drawing/2014/main" id="{3516E81F-258F-43FA-A31A-089E5595BBF5}"/>
+              </a:ext>
+            </a:extLst>
+          </p:cNvPr>
+          <p:cNvPicPr>
+            <a:picLocks noChangeAspect="1"/>
+          </p:cNvPicPr>
+          <p:nvPr/>
+        </p:nvPicPr>
+        <p:blipFill>
+          <a:blip r:embed="rId2">
+            <a:extLst>
+              <a:ext uri="{BEBA8EAE-BF5A-486C-A8C5-ECC9F3942E4B}">
+                <a14:imgProps xmlns:a14="http://schemas.microsoft.com/office/drawing/2010/main">
+                  <a14:imgLayer r:embed="rId3">
+                    <a14:imgEffect>
+                      <a14:backgroundRemoval t="10000" b="90000" l="10000" r="90000"/>
+                    </a14:imgEffect>
+                  </a14:imgLayer>
+                </a14:imgProps>
+              </a:ext>
+              <a:ext uri="{28A0092B-C50C-407E-A947-70E740481C1C}">
+                <a14:useLocalDpi xmlns:a14="http://schemas.microsoft.com/office/drawing/2010/main" val="0"/>
+              </a:ext>
+            </a:extLst>
+          </a:blip>
+          <a:stretch>
+            <a:fillRect/>
+          </a:stretch>
+        </p:blipFill>
+        <p:spPr>
+          <a:xfrm>
+            <a:off x="-457200" y="171450"/>
+            <a:ext cx="6971983" cy="6858000"/>
+          </a:xfrm>
+          <a:prstGeom prst="rect">
+            <a:avLst/>
+          </a:prstGeom>
+        </p:spPr>
+      </p:pic>
     </p:spTree>
   </p:cSld>
   <p:clrMapOvr>
@@ -3111,7 +3205,7 @@
 </file>
 
 <file path=ppt/slides/slide10.xml><?xml version="1.0" encoding="utf-8"?>
-<p:sld xmlns:p="http://schemas.openxmlformats.org/presentationml/2006/main" xmlns:a="http://schemas.openxmlformats.org/drawingml/2006/main">
+<p:sld xmlns:a="http://schemas.openxmlformats.org/drawingml/2006/main" xmlns:r="http://schemas.openxmlformats.org/officeDocument/2006/relationships" xmlns:p="http://schemas.openxmlformats.org/presentationml/2006/main">
   <p:cSld>
     <p:spTree>
       <p:nvGrpSpPr>
@@ -3127,7 +3221,7 @@
           <a:chExt cx="0" cy="0"/>
         </a:xfrm>
       </p:grpSpPr>
-      <p:sp xmlns:r="http://schemas.openxmlformats.org/officeDocument/2006/relationships">
+      <p:sp>
         <p:nvSpPr>
           <p:cNvPr id="2" name="Title 1"/>
           <p:cNvSpPr>
@@ -3145,15 +3239,15 @@
             <a:r>
               <a:rPr lang="en-US" sz="5000">
                 <a:solidFill>
-                  <a:srgbClr val="BD8038"/>
+                  <a:srgbClr val="2E3E80"/>
                 </a:solidFill>
               </a:rPr>
-              <a:t>Question 5</a:t>
-            </a:r>
-          </a:p>
-        </p:txBody>
-      </p:sp>
-      <p:sp xmlns:r="http://schemas.openxmlformats.org/officeDocument/2006/relationships">
+              <a:t>Answer</a:t>
+            </a:r>
+          </a:p>
+        </p:txBody>
+      </p:sp>
+      <p:sp>
         <p:nvSpPr>
           <p:cNvPr id="3" name="Content Placeholder 2"/>
           <p:cNvSpPr>
@@ -3171,10 +3265,10 @@
             <a:r>
               <a:rPr lang="en-US" sz="4000">
                 <a:solidFill>
-                  <a:srgbClr val="BD8038"/>
+                  <a:srgbClr val="2E3E80"/>
                 </a:solidFill>
               </a:rPr>
-              <a:t>What is Market Failure?</a:t>
+              <a:t>Percentage change in quantity supplied caused by a 1 percent change in price.</a:t>
             </a:r>
           </a:p>
         </p:txBody>
@@ -3188,7 +3282,7 @@
 </file>
 
 <file path=ppt/slides/slide11.xml><?xml version="1.0" encoding="utf-8"?>
-<p:sld xmlns:p="http://schemas.openxmlformats.org/presentationml/2006/main" xmlns:a="http://schemas.openxmlformats.org/drawingml/2006/main">
+<p:sld xmlns:a="http://schemas.openxmlformats.org/drawingml/2006/main" xmlns:r="http://schemas.openxmlformats.org/officeDocument/2006/relationships" xmlns:p="http://schemas.openxmlformats.org/presentationml/2006/main">
   <p:cSld>
     <p:spTree>
       <p:nvGrpSpPr>
@@ -3204,7 +3298,7 @@
           <a:chExt cx="0" cy="0"/>
         </a:xfrm>
       </p:grpSpPr>
-      <p:sp xmlns:r="http://schemas.openxmlformats.org/officeDocument/2006/relationships">
+      <p:sp>
         <p:nvSpPr>
           <p:cNvPr id="2" name="Title 1"/>
           <p:cNvSpPr>
@@ -3222,15 +3316,15 @@
             <a:r>
               <a:rPr lang="en-US" sz="5000">
                 <a:solidFill>
-                  <a:srgbClr val="BD8038"/>
+                  <a:srgbClr val="2E3E80"/>
                 </a:solidFill>
               </a:rPr>
-              <a:t>Answer</a:t>
-            </a:r>
-          </a:p>
-        </p:txBody>
-      </p:sp>
-      <p:sp xmlns:r="http://schemas.openxmlformats.org/officeDocument/2006/relationships">
+              <a:t>Question 5</a:t>
+            </a:r>
+          </a:p>
+        </p:txBody>
+      </p:sp>
+      <p:sp>
         <p:nvSpPr>
           <p:cNvPr id="3" name="Content Placeholder 2"/>
           <p:cNvSpPr>
@@ -3248,10 +3342,10 @@
             <a:r>
               <a:rPr lang="en-US" sz="4000">
                 <a:solidFill>
-                  <a:srgbClr val="BD8038"/>
+                  <a:srgbClr val="2E3E80"/>
                 </a:solidFill>
               </a:rPr>
-              <a:t>Market failure is the economic situation defined by an inefficient distribution of goods and services in the free market.</a:t>
+              <a:t>What is Market Failure?</a:t>
             </a:r>
           </a:p>
         </p:txBody>
@@ -3264,8 +3358,8 @@
 </p:sld>
 </file>
 
-<file path=ppt/slides/slide2.xml><?xml version="1.0" encoding="utf-8"?>
-<p:sld xmlns:p="http://schemas.openxmlformats.org/presentationml/2006/main" xmlns:a="http://schemas.openxmlformats.org/drawingml/2006/main">
+<file path=ppt/slides/slide12.xml><?xml version="1.0" encoding="utf-8"?>
+<p:sld xmlns:a="http://schemas.openxmlformats.org/drawingml/2006/main" xmlns:r="http://schemas.openxmlformats.org/officeDocument/2006/relationships" xmlns:p="http://schemas.openxmlformats.org/presentationml/2006/main">
   <p:cSld>
     <p:spTree>
       <p:nvGrpSpPr>
@@ -3281,7 +3375,7 @@
           <a:chExt cx="0" cy="0"/>
         </a:xfrm>
       </p:grpSpPr>
-      <p:sp xmlns:r="http://schemas.openxmlformats.org/officeDocument/2006/relationships">
+      <p:sp>
         <p:nvSpPr>
           <p:cNvPr id="2" name="Title 1"/>
           <p:cNvSpPr>
@@ -3299,15 +3393,15 @@
             <a:r>
               <a:rPr lang="en-US" sz="5000">
                 <a:solidFill>
-                  <a:srgbClr val="BD8038"/>
+                  <a:srgbClr val="2E3E80"/>
                 </a:solidFill>
               </a:rPr>
-              <a:t>Question 1</a:t>
-            </a:r>
-          </a:p>
-        </p:txBody>
-      </p:sp>
-      <p:sp xmlns:r="http://schemas.openxmlformats.org/officeDocument/2006/relationships">
+              <a:t>Answer</a:t>
+            </a:r>
+          </a:p>
+        </p:txBody>
+      </p:sp>
+      <p:sp>
         <p:nvSpPr>
           <p:cNvPr id="3" name="Content Placeholder 2"/>
           <p:cNvSpPr>
@@ -3325,10 +3419,10 @@
             <a:r>
               <a:rPr lang="en-US" sz="4000">
                 <a:solidFill>
-                  <a:srgbClr val="BD8038"/>
+                  <a:srgbClr val="2E3E80"/>
                 </a:solidFill>
               </a:rPr>
-              <a:t>What is the Law of demand?</a:t>
+              <a:t>Market failure is the economic situation defined by an inefficient distribution of goods and services in the free market.</a:t>
             </a:r>
           </a:p>
         </p:txBody>
@@ -3341,8 +3435,8 @@
 </p:sld>
 </file>
 
-<file path=ppt/slides/slide3.xml><?xml version="1.0" encoding="utf-8"?>
-<p:sld xmlns:p="http://schemas.openxmlformats.org/presentationml/2006/main" xmlns:a="http://schemas.openxmlformats.org/drawingml/2006/main">
+<file path=ppt/slides/slide2.xml><?xml version="1.0" encoding="utf-8"?>
+<p:sld xmlns:a="http://schemas.openxmlformats.org/drawingml/2006/main" xmlns:r="http://schemas.openxmlformats.org/officeDocument/2006/relationships" xmlns:p="http://schemas.openxmlformats.org/presentationml/2006/main">
   <p:cSld>
     <p:spTree>
       <p:nvGrpSpPr>
@@ -3358,9 +3452,15 @@
           <a:chExt cx="0" cy="0"/>
         </a:xfrm>
       </p:grpSpPr>
-      <p:sp xmlns:r="http://schemas.openxmlformats.org/officeDocument/2006/relationships">
-        <p:nvSpPr>
-          <p:cNvPr id="2" name="Title 1"/>
+      <p:sp>
+        <p:nvSpPr>
+          <p:cNvPr id="2" name="Title 1">
+            <a:extLst>
+              <a:ext uri="{FF2B5EF4-FFF2-40B4-BE49-F238E27FC236}">
+                <a16:creationId xmlns:a16="http://schemas.microsoft.com/office/drawing/2014/main" id="{158DEC97-676D-4BCC-8C43-1656D248EAD0}"/>
+              </a:ext>
+            </a:extLst>
+          </p:cNvPr>
           <p:cNvSpPr>
             <a:spLocks noGrp="1"/>
           </p:cNvSpPr>
@@ -3373,20 +3473,19 @@
           <a:bodyPr/>
           <a:lstStyle/>
           <a:p>
-            <a:r>
-              <a:rPr lang="en-US" sz="5000">
-                <a:solidFill>
-                  <a:srgbClr val="BD8038"/>
-                </a:solidFill>
-              </a:rPr>
-              <a:t>Answer</a:t>
-            </a:r>
-          </a:p>
-        </p:txBody>
-      </p:sp>
-      <p:sp xmlns:r="http://schemas.openxmlformats.org/officeDocument/2006/relationships">
-        <p:nvSpPr>
-          <p:cNvPr id="3" name="Content Placeholder 2"/>
+            <a:endParaRPr lang="en-SG"/>
+          </a:p>
+        </p:txBody>
+      </p:sp>
+      <p:sp>
+        <p:nvSpPr>
+          <p:cNvPr id="3" name="Content Placeholder 2">
+            <a:extLst>
+              <a:ext uri="{FF2B5EF4-FFF2-40B4-BE49-F238E27FC236}">
+                <a16:creationId xmlns:a16="http://schemas.microsoft.com/office/drawing/2014/main" id="{F4BFC8E7-D41E-42A5-B642-03203C5AE7FB}"/>
+              </a:ext>
+            </a:extLst>
+          </p:cNvPr>
           <p:cNvSpPr>
             <a:spLocks noGrp="1"/>
           </p:cNvSpPr>
@@ -3399,18 +3498,16 @@
           <a:bodyPr/>
           <a:lstStyle/>
           <a:p>
-            <a:r>
-              <a:rPr lang="en-US" sz="4000">
-                <a:solidFill>
-                  <a:srgbClr val="BD8038"/>
-                </a:solidFill>
-              </a:rPr>
-              <a:t>When the price of a good rises, the quantity of the good demanded will fall, ceteris paribus.</a:t>
-            </a:r>
+            <a:endParaRPr lang="en-SG"/>
           </a:p>
         </p:txBody>
       </p:sp>
     </p:spTree>
+    <p:extLst>
+      <p:ext uri="{BB962C8B-B14F-4D97-AF65-F5344CB8AC3E}">
+        <p14:creationId xmlns:p14="http://schemas.microsoft.com/office/powerpoint/2010/main" val="853432824"/>
+      </p:ext>
+    </p:extLst>
   </p:cSld>
   <p:clrMapOvr>
     <a:masterClrMapping/>
@@ -3418,8 +3515,8 @@
 </p:sld>
 </file>
 
-<file path=ppt/slides/slide4.xml><?xml version="1.0" encoding="utf-8"?>
-<p:sld xmlns:p="http://schemas.openxmlformats.org/presentationml/2006/main" xmlns:a="http://schemas.openxmlformats.org/drawingml/2006/main">
+<file path=ppt/slides/slide3.xml><?xml version="1.0" encoding="utf-8"?>
+<p:sld xmlns:a="http://schemas.openxmlformats.org/drawingml/2006/main" xmlns:r="http://schemas.openxmlformats.org/officeDocument/2006/relationships" xmlns:p="http://schemas.openxmlformats.org/presentationml/2006/main">
   <p:cSld>
     <p:spTree>
       <p:nvGrpSpPr>
@@ -3435,7 +3532,7 @@
           <a:chExt cx="0" cy="0"/>
         </a:xfrm>
       </p:grpSpPr>
-      <p:sp xmlns:r="http://schemas.openxmlformats.org/officeDocument/2006/relationships">
+      <p:sp>
         <p:nvSpPr>
           <p:cNvPr id="2" name="Title 1"/>
           <p:cNvSpPr>
@@ -3453,15 +3550,15 @@
             <a:r>
               <a:rPr lang="en-US" sz="5000">
                 <a:solidFill>
-                  <a:srgbClr val="BD8038"/>
+                  <a:srgbClr val="2E3E80"/>
                 </a:solidFill>
               </a:rPr>
-              <a:t>Question 2</a:t>
-            </a:r>
-          </a:p>
-        </p:txBody>
-      </p:sp>
-      <p:sp xmlns:r="http://schemas.openxmlformats.org/officeDocument/2006/relationships">
+              <a:t>Question 1</a:t>
+            </a:r>
+          </a:p>
+        </p:txBody>
+      </p:sp>
+      <p:sp>
         <p:nvSpPr>
           <p:cNvPr id="3" name="Content Placeholder 2"/>
           <p:cNvSpPr>
@@ -3479,10 +3576,10 @@
             <a:r>
               <a:rPr lang="en-US" sz="4000">
                 <a:solidFill>
-                  <a:srgbClr val="BD8038"/>
+                  <a:srgbClr val="2E3E80"/>
                 </a:solidFill>
               </a:rPr>
-              <a:t>What is the Law of supply?</a:t>
+              <a:t>What is the Law of demand?</a:t>
             </a:r>
           </a:p>
         </p:txBody>
@@ -3495,8 +3592,8 @@
 </p:sld>
 </file>
 
-<file path=ppt/slides/slide5.xml><?xml version="1.0" encoding="utf-8"?>
-<p:sld xmlns:p="http://schemas.openxmlformats.org/presentationml/2006/main" xmlns:a="http://schemas.openxmlformats.org/drawingml/2006/main">
+<file path=ppt/slides/slide4.xml><?xml version="1.0" encoding="utf-8"?>
+<p:sld xmlns:a="http://schemas.openxmlformats.org/drawingml/2006/main" xmlns:r="http://schemas.openxmlformats.org/officeDocument/2006/relationships" xmlns:p="http://schemas.openxmlformats.org/presentationml/2006/main">
   <p:cSld>
     <p:spTree>
       <p:nvGrpSpPr>
@@ -3512,7 +3609,7 @@
           <a:chExt cx="0" cy="0"/>
         </a:xfrm>
       </p:grpSpPr>
-      <p:sp xmlns:r="http://schemas.openxmlformats.org/officeDocument/2006/relationships">
+      <p:sp>
         <p:nvSpPr>
           <p:cNvPr id="2" name="Title 1"/>
           <p:cNvSpPr>
@@ -3530,7 +3627,7 @@
             <a:r>
               <a:rPr lang="en-US" sz="5000">
                 <a:solidFill>
-                  <a:srgbClr val="BD8038"/>
+                  <a:srgbClr val="2E3E80"/>
                 </a:solidFill>
               </a:rPr>
               <a:t>Answer</a:t>
@@ -3538,7 +3635,7 @@
           </a:p>
         </p:txBody>
       </p:sp>
-      <p:sp xmlns:r="http://schemas.openxmlformats.org/officeDocument/2006/relationships">
+      <p:sp>
         <p:nvSpPr>
           <p:cNvPr id="3" name="Content Placeholder 2"/>
           <p:cNvSpPr>
@@ -3556,10 +3653,10 @@
             <a:r>
               <a:rPr lang="en-US" sz="4000">
                 <a:solidFill>
-                  <a:srgbClr val="BD8038"/>
+                  <a:srgbClr val="2E3E80"/>
                 </a:solidFill>
               </a:rPr>
-              <a:t>When the price of a good increases, the quantity supplied increases, ceteris paribus.</a:t>
+              <a:t>When the price of a good rises, the quantity of the good demanded will fall, ceteris paribus.</a:t>
             </a:r>
           </a:p>
         </p:txBody>
@@ -3572,8 +3669,8 @@
 </p:sld>
 </file>
 
-<file path=ppt/slides/slide6.xml><?xml version="1.0" encoding="utf-8"?>
-<p:sld xmlns:p="http://schemas.openxmlformats.org/presentationml/2006/main" xmlns:a="http://schemas.openxmlformats.org/drawingml/2006/main">
+<file path=ppt/slides/slide5.xml><?xml version="1.0" encoding="utf-8"?>
+<p:sld xmlns:a="http://schemas.openxmlformats.org/drawingml/2006/main" xmlns:r="http://schemas.openxmlformats.org/officeDocument/2006/relationships" xmlns:p="http://schemas.openxmlformats.org/presentationml/2006/main">
   <p:cSld>
     <p:spTree>
       <p:nvGrpSpPr>
@@ -3589,7 +3686,7 @@
           <a:chExt cx="0" cy="0"/>
         </a:xfrm>
       </p:grpSpPr>
-      <p:sp xmlns:r="http://schemas.openxmlformats.org/officeDocument/2006/relationships">
+      <p:sp>
         <p:nvSpPr>
           <p:cNvPr id="2" name="Title 1"/>
           <p:cNvSpPr>
@@ -3607,15 +3704,15 @@
             <a:r>
               <a:rPr lang="en-US" sz="5000">
                 <a:solidFill>
-                  <a:srgbClr val="BD8038"/>
+                  <a:srgbClr val="2E3E80"/>
                 </a:solidFill>
               </a:rPr>
-              <a:t>Question 3</a:t>
-            </a:r>
-          </a:p>
-        </p:txBody>
-      </p:sp>
-      <p:sp xmlns:r="http://schemas.openxmlformats.org/officeDocument/2006/relationships">
+              <a:t>Question 2</a:t>
+            </a:r>
+          </a:p>
+        </p:txBody>
+      </p:sp>
+      <p:sp>
         <p:nvSpPr>
           <p:cNvPr id="3" name="Content Placeholder 2"/>
           <p:cNvSpPr>
@@ -3633,10 +3730,10 @@
             <a:r>
               <a:rPr lang="en-US" sz="4000">
                 <a:solidFill>
-                  <a:srgbClr val="BD8038"/>
+                  <a:srgbClr val="2E3E80"/>
                 </a:solidFill>
               </a:rPr>
-              <a:t>What is price elasticity of demand?</a:t>
+              <a:t>What is the Law of supply?</a:t>
             </a:r>
           </a:p>
         </p:txBody>
@@ -3649,8 +3746,8 @@
 </p:sld>
 </file>
 
-<file path=ppt/slides/slide7.xml><?xml version="1.0" encoding="utf-8"?>
-<p:sld xmlns:p="http://schemas.openxmlformats.org/presentationml/2006/main" xmlns:a="http://schemas.openxmlformats.org/drawingml/2006/main">
+<file path=ppt/slides/slide6.xml><?xml version="1.0" encoding="utf-8"?>
+<p:sld xmlns:a="http://schemas.openxmlformats.org/drawingml/2006/main" xmlns:r="http://schemas.openxmlformats.org/officeDocument/2006/relationships" xmlns:p="http://schemas.openxmlformats.org/presentationml/2006/main">
   <p:cSld>
     <p:spTree>
       <p:nvGrpSpPr>
@@ -3666,7 +3763,7 @@
           <a:chExt cx="0" cy="0"/>
         </a:xfrm>
       </p:grpSpPr>
-      <p:sp xmlns:r="http://schemas.openxmlformats.org/officeDocument/2006/relationships">
+      <p:sp>
         <p:nvSpPr>
           <p:cNvPr id="2" name="Title 1"/>
           <p:cNvSpPr>
@@ -3684,7 +3781,7 @@
             <a:r>
               <a:rPr lang="en-US" sz="5000">
                 <a:solidFill>
-                  <a:srgbClr val="BD8038"/>
+                  <a:srgbClr val="2E3E80"/>
                 </a:solidFill>
               </a:rPr>
               <a:t>Answer</a:t>
@@ -3692,7 +3789,7 @@
           </a:p>
         </p:txBody>
       </p:sp>
-      <p:sp xmlns:r="http://schemas.openxmlformats.org/officeDocument/2006/relationships">
+      <p:sp>
         <p:nvSpPr>
           <p:cNvPr id="3" name="Content Placeholder 2"/>
           <p:cNvSpPr>
@@ -3710,10 +3807,10 @@
             <a:r>
               <a:rPr lang="en-US" sz="4000">
                 <a:solidFill>
-                  <a:srgbClr val="BD8038"/>
+                  <a:srgbClr val="2E3E80"/>
                 </a:solidFill>
               </a:rPr>
-              <a:t>Percentage change in quantity demanded caused by a 1 percent change in price.</a:t>
+              <a:t>When the price of a good increases, the quantity supplied increases, ceteris paribus.</a:t>
             </a:r>
           </a:p>
         </p:txBody>
@@ -3726,8 +3823,8 @@
 </p:sld>
 </file>
 
-<file path=ppt/slides/slide8.xml><?xml version="1.0" encoding="utf-8"?>
-<p:sld xmlns:p="http://schemas.openxmlformats.org/presentationml/2006/main" xmlns:a="http://schemas.openxmlformats.org/drawingml/2006/main">
+<file path=ppt/slides/slide7.xml><?xml version="1.0" encoding="utf-8"?>
+<p:sld xmlns:a="http://schemas.openxmlformats.org/drawingml/2006/main" xmlns:r="http://schemas.openxmlformats.org/officeDocument/2006/relationships" xmlns:p="http://schemas.openxmlformats.org/presentationml/2006/main">
   <p:cSld>
     <p:spTree>
       <p:nvGrpSpPr>
@@ -3743,7 +3840,7 @@
           <a:chExt cx="0" cy="0"/>
         </a:xfrm>
       </p:grpSpPr>
-      <p:sp xmlns:r="http://schemas.openxmlformats.org/officeDocument/2006/relationships">
+      <p:sp>
         <p:nvSpPr>
           <p:cNvPr id="2" name="Title 1"/>
           <p:cNvSpPr>
@@ -3761,15 +3858,15 @@
             <a:r>
               <a:rPr lang="en-US" sz="5000">
                 <a:solidFill>
-                  <a:srgbClr val="BD8038"/>
+                  <a:srgbClr val="2E3E80"/>
                 </a:solidFill>
               </a:rPr>
-              <a:t>Question 4</a:t>
-            </a:r>
-          </a:p>
-        </p:txBody>
-      </p:sp>
-      <p:sp xmlns:r="http://schemas.openxmlformats.org/officeDocument/2006/relationships">
+              <a:t>Question 3</a:t>
+            </a:r>
+          </a:p>
+        </p:txBody>
+      </p:sp>
+      <p:sp>
         <p:nvSpPr>
           <p:cNvPr id="3" name="Content Placeholder 2"/>
           <p:cNvSpPr>
@@ -3787,10 +3884,10 @@
             <a:r>
               <a:rPr lang="en-US" sz="4000">
                 <a:solidFill>
-                  <a:srgbClr val="BD8038"/>
+                  <a:srgbClr val="2E3E80"/>
                 </a:solidFill>
               </a:rPr>
-              <a:t>What is price elasticity of supply?</a:t>
+              <a:t>What is price elasticity of demand?</a:t>
             </a:r>
           </a:p>
         </p:txBody>
@@ -3803,8 +3900,8 @@
 </p:sld>
 </file>
 
-<file path=ppt/slides/slide9.xml><?xml version="1.0" encoding="utf-8"?>
-<p:sld xmlns:p="http://schemas.openxmlformats.org/presentationml/2006/main" xmlns:a="http://schemas.openxmlformats.org/drawingml/2006/main">
+<file path=ppt/slides/slide8.xml><?xml version="1.0" encoding="utf-8"?>
+<p:sld xmlns:a="http://schemas.openxmlformats.org/drawingml/2006/main" xmlns:r="http://schemas.openxmlformats.org/officeDocument/2006/relationships" xmlns:p="http://schemas.openxmlformats.org/presentationml/2006/main">
   <p:cSld>
     <p:spTree>
       <p:nvGrpSpPr>
@@ -3820,7 +3917,7 @@
           <a:chExt cx="0" cy="0"/>
         </a:xfrm>
       </p:grpSpPr>
-      <p:sp xmlns:r="http://schemas.openxmlformats.org/officeDocument/2006/relationships">
+      <p:sp>
         <p:nvSpPr>
           <p:cNvPr id="2" name="Title 1"/>
           <p:cNvSpPr>
@@ -3838,7 +3935,7 @@
             <a:r>
               <a:rPr lang="en-US" sz="5000">
                 <a:solidFill>
-                  <a:srgbClr val="BD8038"/>
+                  <a:srgbClr val="2E3E80"/>
                 </a:solidFill>
               </a:rPr>
               <a:t>Answer</a:t>
@@ -3846,7 +3943,7 @@
           </a:p>
         </p:txBody>
       </p:sp>
-      <p:sp xmlns:r="http://schemas.openxmlformats.org/officeDocument/2006/relationships">
+      <p:sp>
         <p:nvSpPr>
           <p:cNvPr id="3" name="Content Placeholder 2"/>
           <p:cNvSpPr>
@@ -3864,10 +3961,87 @@
             <a:r>
               <a:rPr lang="en-US" sz="4000">
                 <a:solidFill>
-                  <a:srgbClr val="BD8038"/>
+                  <a:srgbClr val="2E3E80"/>
                 </a:solidFill>
               </a:rPr>
-              <a:t>Percentage change in quantity supplied caused by a 1 percent change in price.</a:t>
+              <a:t>Percentage change in quantity demanded caused by a 1 percent change in price.</a:t>
+            </a:r>
+          </a:p>
+        </p:txBody>
+      </p:sp>
+    </p:spTree>
+  </p:cSld>
+  <p:clrMapOvr>
+    <a:masterClrMapping/>
+  </p:clrMapOvr>
+</p:sld>
+</file>
+
+<file path=ppt/slides/slide9.xml><?xml version="1.0" encoding="utf-8"?>
+<p:sld xmlns:a="http://schemas.openxmlformats.org/drawingml/2006/main" xmlns:r="http://schemas.openxmlformats.org/officeDocument/2006/relationships" xmlns:p="http://schemas.openxmlformats.org/presentationml/2006/main">
+  <p:cSld>
+    <p:spTree>
+      <p:nvGrpSpPr>
+        <p:cNvPr id="1" name=""/>
+        <p:cNvGrpSpPr/>
+        <p:nvPr/>
+      </p:nvGrpSpPr>
+      <p:grpSpPr>
+        <a:xfrm>
+          <a:off x="0" y="0"/>
+          <a:ext cx="0" cy="0"/>
+          <a:chOff x="0" y="0"/>
+          <a:chExt cx="0" cy="0"/>
+        </a:xfrm>
+      </p:grpSpPr>
+      <p:sp>
+        <p:nvSpPr>
+          <p:cNvPr id="2" name="Title 1"/>
+          <p:cNvSpPr>
+            <a:spLocks noGrp="1"/>
+          </p:cNvSpPr>
+          <p:nvPr>
+            <p:ph type="title"/>
+          </p:nvPr>
+        </p:nvSpPr>
+        <p:spPr/>
+        <p:txBody>
+          <a:bodyPr/>
+          <a:lstStyle/>
+          <a:p>
+            <a:r>
+              <a:rPr lang="en-US" sz="5000">
+                <a:solidFill>
+                  <a:srgbClr val="2E3E80"/>
+                </a:solidFill>
+              </a:rPr>
+              <a:t>Question 4</a:t>
+            </a:r>
+          </a:p>
+        </p:txBody>
+      </p:sp>
+      <p:sp>
+        <p:nvSpPr>
+          <p:cNvPr id="3" name="Content Placeholder 2"/>
+          <p:cNvSpPr>
+            <a:spLocks noGrp="1"/>
+          </p:cNvSpPr>
+          <p:nvPr>
+            <p:ph idx="1"/>
+          </p:nvPr>
+        </p:nvSpPr>
+        <p:spPr/>
+        <p:txBody>
+          <a:bodyPr/>
+          <a:lstStyle/>
+          <a:p>
+            <a:r>
+              <a:rPr lang="en-US" sz="4000">
+                <a:solidFill>
+                  <a:srgbClr val="2E3E80"/>
+                </a:solidFill>
+              </a:rPr>
+              <a:t>What is price elasticity of supply?</a:t>
             </a:r>
           </a:p>
         </p:txBody>

</xml_diff>

<commit_message>
Update pptx Color Options
</commit_message>
<xml_diff>
--- a/pptx/Micro-Economics.pptx
+++ b/pptx/Micro-Economics.pptx
@@ -2551,7 +2551,7 @@
     <p:bg>
       <p:bgPr>
         <a:solidFill>
-          <a:srgbClr val="FAEBEF"/>
+          <a:srgbClr val="FFFFFF"/>
         </a:solidFill>
       </p:bgPr>
     </p:bg>
@@ -3094,7 +3094,7 @@
             <a:r>
               <a:rPr lang="en-US" sz="6000">
                 <a:solidFill>
-                  <a:srgbClr val="2E3E80"/>
+                  <a:srgbClr val="000000"/>
                 </a:solidFill>
               </a:rPr>
               <a:t>Micro-Economics</a:t>
@@ -3145,7 +3145,7 @@
             <a:r>
               <a:rPr lang="en-US" sz="5000">
                 <a:solidFill>
-                  <a:srgbClr val="2E3E80"/>
+                  <a:srgbClr val="000000"/>
                 </a:solidFill>
               </a:rPr>
               <a:t>Question 5</a:t>
@@ -3171,7 +3171,7 @@
             <a:r>
               <a:rPr lang="en-US" sz="4000">
                 <a:solidFill>
-                  <a:srgbClr val="2E3E80"/>
+                  <a:srgbClr val="000000"/>
                 </a:solidFill>
               </a:rPr>
               <a:t>What is Market Failure?</a:t>
@@ -3222,7 +3222,7 @@
             <a:r>
               <a:rPr lang="en-US" sz="5000">
                 <a:solidFill>
-                  <a:srgbClr val="2E3E80"/>
+                  <a:srgbClr val="000000"/>
                 </a:solidFill>
               </a:rPr>
               <a:t>Answer</a:t>
@@ -3248,7 +3248,7 @@
             <a:r>
               <a:rPr lang="en-US" sz="4000">
                 <a:solidFill>
-                  <a:srgbClr val="2E3E80"/>
+                  <a:srgbClr val="000000"/>
                 </a:solidFill>
               </a:rPr>
               <a:t>Market failure is the economic situation defined by an inefficient distribution of goods and services in the free market.</a:t>
@@ -3299,7 +3299,7 @@
             <a:r>
               <a:rPr lang="en-US" sz="5000">
                 <a:solidFill>
-                  <a:srgbClr val="2E3E80"/>
+                  <a:srgbClr val="000000"/>
                 </a:solidFill>
               </a:rPr>
               <a:t>Question 1</a:t>
@@ -3325,7 +3325,7 @@
             <a:r>
               <a:rPr lang="en-US" sz="4000">
                 <a:solidFill>
-                  <a:srgbClr val="2E3E80"/>
+                  <a:srgbClr val="000000"/>
                 </a:solidFill>
               </a:rPr>
               <a:t>What is the Law of demand?</a:t>
@@ -3376,7 +3376,7 @@
             <a:r>
               <a:rPr lang="en-US" sz="5000">
                 <a:solidFill>
-                  <a:srgbClr val="2E3E80"/>
+                  <a:srgbClr val="000000"/>
                 </a:solidFill>
               </a:rPr>
               <a:t>Answer</a:t>
@@ -3402,7 +3402,7 @@
             <a:r>
               <a:rPr lang="en-US" sz="4000">
                 <a:solidFill>
-                  <a:srgbClr val="2E3E80"/>
+                  <a:srgbClr val="000000"/>
                 </a:solidFill>
               </a:rPr>
               <a:t>When the price of a good rises, the quantity of the good demanded will fall, ceteris paribus.</a:t>
@@ -3453,7 +3453,7 @@
             <a:r>
               <a:rPr lang="en-US" sz="5000">
                 <a:solidFill>
-                  <a:srgbClr val="2E3E80"/>
+                  <a:srgbClr val="000000"/>
                 </a:solidFill>
               </a:rPr>
               <a:t>Question 2</a:t>
@@ -3479,7 +3479,7 @@
             <a:r>
               <a:rPr lang="en-US" sz="4000">
                 <a:solidFill>
-                  <a:srgbClr val="2E3E80"/>
+                  <a:srgbClr val="000000"/>
                 </a:solidFill>
               </a:rPr>
               <a:t>What is the Law of supply?</a:t>
@@ -3530,7 +3530,7 @@
             <a:r>
               <a:rPr lang="en-US" sz="5000">
                 <a:solidFill>
-                  <a:srgbClr val="2E3E80"/>
+                  <a:srgbClr val="000000"/>
                 </a:solidFill>
               </a:rPr>
               <a:t>Answer</a:t>
@@ -3556,7 +3556,7 @@
             <a:r>
               <a:rPr lang="en-US" sz="4000">
                 <a:solidFill>
-                  <a:srgbClr val="2E3E80"/>
+                  <a:srgbClr val="000000"/>
                 </a:solidFill>
               </a:rPr>
               <a:t>When the price of a good increases, the quantity supplied increases, ceteris paribus.</a:t>
@@ -3607,7 +3607,7 @@
             <a:r>
               <a:rPr lang="en-US" sz="5000">
                 <a:solidFill>
-                  <a:srgbClr val="2E3E80"/>
+                  <a:srgbClr val="000000"/>
                 </a:solidFill>
               </a:rPr>
               <a:t>Question 3</a:t>
@@ -3633,7 +3633,7 @@
             <a:r>
               <a:rPr lang="en-US" sz="4000">
                 <a:solidFill>
-                  <a:srgbClr val="2E3E80"/>
+                  <a:srgbClr val="000000"/>
                 </a:solidFill>
               </a:rPr>
               <a:t>What is price elasticity of demand?</a:t>
@@ -3684,7 +3684,7 @@
             <a:r>
               <a:rPr lang="en-US" sz="5000">
                 <a:solidFill>
-                  <a:srgbClr val="2E3E80"/>
+                  <a:srgbClr val="000000"/>
                 </a:solidFill>
               </a:rPr>
               <a:t>Answer</a:t>
@@ -3710,7 +3710,7 @@
             <a:r>
               <a:rPr lang="en-US" sz="4000">
                 <a:solidFill>
-                  <a:srgbClr val="2E3E80"/>
+                  <a:srgbClr val="000000"/>
                 </a:solidFill>
               </a:rPr>
               <a:t>Percentage change in quantity demanded caused by a 1 percent change in price.</a:t>
@@ -3761,7 +3761,7 @@
             <a:r>
               <a:rPr lang="en-US" sz="5000">
                 <a:solidFill>
-                  <a:srgbClr val="2E3E80"/>
+                  <a:srgbClr val="000000"/>
                 </a:solidFill>
               </a:rPr>
               <a:t>Question 4</a:t>
@@ -3787,7 +3787,7 @@
             <a:r>
               <a:rPr lang="en-US" sz="4000">
                 <a:solidFill>
-                  <a:srgbClr val="2E3E80"/>
+                  <a:srgbClr val="000000"/>
                 </a:solidFill>
               </a:rPr>
               <a:t>What is price elasticity of supply?</a:t>
@@ -3838,7 +3838,7 @@
             <a:r>
               <a:rPr lang="en-US" sz="5000">
                 <a:solidFill>
-                  <a:srgbClr val="2E3E80"/>
+                  <a:srgbClr val="000000"/>
                 </a:solidFill>
               </a:rPr>
               <a:t>Answer</a:t>
@@ -3864,7 +3864,7 @@
             <a:r>
               <a:rPr lang="en-US" sz="4000">
                 <a:solidFill>
-                  <a:srgbClr val="2E3E80"/>
+                  <a:srgbClr val="000000"/>
                 </a:solidFill>
               </a:rPr>
               <a:t>Percentage change in quantity supplied caused by a 1 percent change in price.</a:t>

</xml_diff>